<commit_message>
Small changes to PPT
</commit_message>
<xml_diff>
--- a/StreamZ_Apresentation4.pptx
+++ b/StreamZ_Apresentation4.pptx
@@ -377,7 +377,7 @@
           <a:p>
             <a:fld id="{B3BE95CB-A87E-409C-9CB9-073D81AF8FD7}" type="slidenum">
               <a:rPr lang="en-GB" smtClean="0"/>
-              <a:t>‹nº›</a:t>
+              <a:t>‹#›</a:t>
             </a:fld>
             <a:endParaRPr lang="en-GB"/>
           </a:p>
@@ -759,7 +759,7 @@
           <a:p>
             <a:fld id="{75DB3F52-068C-4339-9FA6-06F9AAEB3337}" type="slidenum">
               <a:rPr lang="en-GB" smtClean="0"/>
-              <a:t>‹nº›</a:t>
+              <a:t>‹#›</a:t>
             </a:fld>
             <a:endParaRPr lang="en-GB"/>
           </a:p>
@@ -970,7 +970,7 @@
           <a:p>
             <a:fld id="{75DB3F52-068C-4339-9FA6-06F9AAEB3337}" type="slidenum">
               <a:rPr lang="en-GB" smtClean="0"/>
-              <a:t>‹nº›</a:t>
+              <a:t>‹#›</a:t>
             </a:fld>
             <a:endParaRPr lang="en-GB"/>
           </a:p>
@@ -1231,7 +1231,7 @@
           <a:p>
             <a:fld id="{75DB3F52-068C-4339-9FA6-06F9AAEB3337}" type="slidenum">
               <a:rPr lang="en-GB" smtClean="0"/>
-              <a:t>‹nº›</a:t>
+              <a:t>‹#›</a:t>
             </a:fld>
             <a:endParaRPr lang="en-GB"/>
           </a:p>
@@ -1404,7 +1404,7 @@
           <a:p>
             <a:fld id="{75DB3F52-068C-4339-9FA6-06F9AAEB3337}" type="slidenum">
               <a:rPr lang="en-GB" smtClean="0"/>
-              <a:t>‹nº›</a:t>
+              <a:t>‹#›</a:t>
             </a:fld>
             <a:endParaRPr lang="en-GB"/>
           </a:p>
@@ -1744,7 +1744,7 @@
           <a:p>
             <a:fld id="{75DB3F52-068C-4339-9FA6-06F9AAEB3337}" type="slidenum">
               <a:rPr lang="en-GB" smtClean="0"/>
-              <a:t>‹nº›</a:t>
+              <a:t>‹#›</a:t>
             </a:fld>
             <a:endParaRPr lang="en-GB"/>
           </a:p>
@@ -2022,7 +2022,7 @@
           <a:p>
             <a:fld id="{75DB3F52-068C-4339-9FA6-06F9AAEB3337}" type="slidenum">
               <a:rPr lang="en-GB" smtClean="0"/>
-              <a:t>‹nº›</a:t>
+              <a:t>‹#›</a:t>
             </a:fld>
             <a:endParaRPr lang="en-GB"/>
           </a:p>
@@ -2408,7 +2408,7 @@
           <a:p>
             <a:fld id="{75DB3F52-068C-4339-9FA6-06F9AAEB3337}" type="slidenum">
               <a:rPr lang="en-GB" smtClean="0"/>
-              <a:t>‹nº›</a:t>
+              <a:t>‹#›</a:t>
             </a:fld>
             <a:endParaRPr lang="en-GB"/>
           </a:p>
@@ -2529,7 +2529,7 @@
           <a:p>
             <a:fld id="{75DB3F52-068C-4339-9FA6-06F9AAEB3337}" type="slidenum">
               <a:rPr lang="en-GB" smtClean="0"/>
-              <a:t>‹nº›</a:t>
+              <a:t>‹#›</a:t>
             </a:fld>
             <a:endParaRPr lang="en-GB"/>
           </a:p>
@@ -2713,7 +2713,7 @@
           <a:p>
             <a:fld id="{75DB3F52-068C-4339-9FA6-06F9AAEB3337}" type="slidenum">
               <a:rPr lang="en-GB" smtClean="0"/>
-              <a:t>‹nº›</a:t>
+              <a:t>‹#›</a:t>
             </a:fld>
             <a:endParaRPr lang="en-GB"/>
           </a:p>
@@ -3085,7 +3085,7 @@
           <a:p>
             <a:fld id="{75DB3F52-068C-4339-9FA6-06F9AAEB3337}" type="slidenum">
               <a:rPr lang="en-GB" smtClean="0"/>
-              <a:t>‹nº›</a:t>
+              <a:t>‹#›</a:t>
             </a:fld>
             <a:endParaRPr lang="en-GB"/>
           </a:p>
@@ -3431,7 +3431,7 @@
           <a:p>
             <a:fld id="{75DB3F52-068C-4339-9FA6-06F9AAEB3337}" type="slidenum">
               <a:rPr lang="en-GB" smtClean="0"/>
-              <a:t>‹nº›</a:t>
+              <a:t>‹#›</a:t>
             </a:fld>
             <a:endParaRPr lang="en-GB"/>
           </a:p>
@@ -3761,7 +3761,7 @@
           <a:p>
             <a:fld id="{75DB3F52-068C-4339-9FA6-06F9AAEB3337}" type="slidenum">
               <a:rPr lang="en-GB" smtClean="0"/>
-              <a:t>‹nº›</a:t>
+              <a:t>‹#›</a:t>
             </a:fld>
             <a:endParaRPr lang="en-GB"/>
           </a:p>
@@ -4896,7 +4896,7 @@
                 </a:solidFill>
                 <a:latin typeface="Bahnschrift SemiLight" panose="020B0502040204020203" pitchFamily="34" charset="0"/>
               </a:rPr>
-              <a:t>Ficheiros</a:t>
+              <a:t>Ficheiros - Users</a:t>
             </a:r>
             <a:endParaRPr lang="en-GB" sz="6600" dirty="0">
               <a:solidFill>
@@ -4940,47 +4940,6 @@
           </a:prstGeom>
         </p:spPr>
       </p:pic>
-      <p:sp>
-        <p:nvSpPr>
-          <p:cNvPr id="19" name="CaixaDeTexto 18">
-            <a:extLst>
-              <a:ext uri="{FF2B5EF4-FFF2-40B4-BE49-F238E27FC236}">
-                <a16:creationId xmlns:a16="http://schemas.microsoft.com/office/drawing/2014/main" id="{77FEEC95-2BDB-42D2-82F4-8C14CB9F5E66}"/>
-              </a:ext>
-            </a:extLst>
-          </p:cNvPr>
-          <p:cNvSpPr txBox="1"/>
-          <p:nvPr/>
-        </p:nvSpPr>
-        <p:spPr>
-          <a:xfrm>
-            <a:off x="389823" y="1787840"/>
-            <a:ext cx="3252778" cy="461665"/>
-          </a:xfrm>
-          <a:prstGeom prst="rect">
-            <a:avLst/>
-          </a:prstGeom>
-          <a:noFill/>
-        </p:spPr>
-        <p:txBody>
-          <a:bodyPr wrap="square" rtlCol="0">
-            <a:spAutoFit/>
-          </a:bodyPr>
-          <a:lstStyle/>
-          <a:p>
-            <a:pPr algn="ctr"/>
-            <a:r>
-              <a:rPr lang="pt-PT" sz="2400" dirty="0"/>
-              <a:t>Ficheiro </a:t>
-            </a:r>
-            <a:r>
-              <a:rPr lang="pt-PT" sz="2400" dirty="0" err="1"/>
-              <a:t>Users</a:t>
-            </a:r>
-            <a:endParaRPr lang="en-GB" sz="2400" dirty="0"/>
-          </a:p>
-        </p:txBody>
-      </p:sp>
       <p:cxnSp>
         <p:nvCxnSpPr>
           <p:cNvPr id="21" name="Conexão reta unidirecional 20">
@@ -5843,7 +5802,7 @@
           <a:p>
             <a:r>
               <a:rPr lang="pt-PT" dirty="0"/>
-              <a:t>Após o numero de elementos de um certo parâmetro surgem, separados por “ , “, todos os elementos que lhe pertencem</a:t>
+              <a:t>Após o número de elementos de um certo parâmetro surgem, separados por “ , “ todos os elementos que lhe pertencem</a:t>
             </a:r>
             <a:endParaRPr lang="en-GB" dirty="0"/>
           </a:p>
@@ -6760,7 +6719,7 @@
                 </a:solidFill>
                 <a:latin typeface="Bahnschrift SemiLight" panose="020B0502040204020203" pitchFamily="34" charset="0"/>
               </a:rPr>
-              <a:t>Ficheiros</a:t>
+              <a:t>Ficheiros - Streams</a:t>
             </a:r>
             <a:endParaRPr lang="en-GB" sz="6600" dirty="0">
               <a:solidFill>
@@ -7695,7 +7654,7 @@
         <p:spPr>
           <a:xfrm>
             <a:off x="1197954" y="4996370"/>
-            <a:ext cx="8753913" cy="646331"/>
+            <a:ext cx="9841958" cy="646331"/>
           </a:xfrm>
           <a:prstGeom prst="rect">
             <a:avLst/>
@@ -7710,97 +7669,17 @@
           <a:p>
             <a:r>
               <a:rPr lang="pt-PT" dirty="0"/>
-              <a:t>Após Nº </a:t>
-            </a:r>
-            <a:r>
-              <a:rPr lang="pt-PT" dirty="0" err="1"/>
-              <a:t>Viewers</a:t>
+              <a:t>Após Nº Viewers surge, Nº FeedBack, lista dos nicks e feedback correspondente, Nº likes, Nº dislikes, </a:t>
+            </a:r>
+          </a:p>
+          <a:p>
+            <a:r>
+              <a:rPr lang="pt-PT" sz="1600" dirty="0"/>
+              <a:t>(Se PrivateStream )   </a:t>
             </a:r>
             <a:r>
               <a:rPr lang="pt-PT" dirty="0"/>
-              <a:t> surge, Nº </a:t>
-            </a:r>
-            <a:r>
-              <a:rPr lang="pt-PT" dirty="0" err="1"/>
-              <a:t>FeedBack</a:t>
-            </a:r>
-            <a:r>
-              <a:rPr lang="pt-PT" dirty="0"/>
-              <a:t>, lista dos </a:t>
-            </a:r>
-            <a:r>
-              <a:rPr lang="pt-PT" dirty="0" err="1"/>
-              <a:t>nicks</a:t>
-            </a:r>
-            <a:r>
-              <a:rPr lang="pt-PT" dirty="0"/>
-              <a:t>, Nº </a:t>
-            </a:r>
-            <a:r>
-              <a:rPr lang="pt-PT" dirty="0" err="1"/>
-              <a:t>likes</a:t>
-            </a:r>
-            <a:r>
-              <a:rPr lang="pt-PT" dirty="0"/>
-              <a:t>, Nº </a:t>
-            </a:r>
-            <a:r>
-              <a:rPr lang="pt-PT" dirty="0" err="1"/>
-              <a:t>dislikes</a:t>
-            </a:r>
-            <a:r>
-              <a:rPr lang="pt-PT" dirty="0"/>
-              <a:t>, </a:t>
-            </a:r>
-          </a:p>
-          <a:p>
-            <a:r>
-              <a:rPr lang="pt-PT" sz="1600" dirty="0"/>
-              <a:t>(Se </a:t>
-            </a:r>
-            <a:r>
-              <a:rPr lang="pt-PT" sz="1600" dirty="0" err="1"/>
-              <a:t>PrivateStream</a:t>
-            </a:r>
-            <a:r>
-              <a:rPr lang="pt-PT" sz="1600" dirty="0"/>
-              <a:t> + -&gt;)   </a:t>
-            </a:r>
-            <a:r>
-              <a:rPr lang="pt-PT" dirty="0"/>
-              <a:t>Nº </a:t>
-            </a:r>
-            <a:r>
-              <a:rPr lang="pt-PT" dirty="0" err="1"/>
-              <a:t>comments</a:t>
-            </a:r>
-            <a:r>
-              <a:rPr lang="pt-PT" dirty="0"/>
-              <a:t>, lista dos </a:t>
-            </a:r>
-            <a:r>
-              <a:rPr lang="pt-PT" dirty="0" err="1"/>
-              <a:t>comments</a:t>
-            </a:r>
-            <a:r>
-              <a:rPr lang="pt-PT" dirty="0"/>
-              <a:t>, Nº </a:t>
-            </a:r>
-            <a:r>
-              <a:rPr lang="pt-PT" dirty="0" err="1"/>
-              <a:t>whitelisted</a:t>
-            </a:r>
-            <a:r>
-              <a:rPr lang="pt-PT" dirty="0"/>
-              <a:t>, lista </a:t>
-            </a:r>
-            <a:r>
-              <a:rPr lang="pt-PT" dirty="0" err="1"/>
-              <a:t>nicks</a:t>
-            </a:r>
-            <a:r>
-              <a:rPr lang="pt-PT" dirty="0"/>
-              <a:t> ,</a:t>
+              <a:t>Nº comments, lista dos comments, Nº whitelisted, lista nicks whitelisted ,</a:t>
             </a:r>
             <a:endParaRPr lang="en-GB" dirty="0"/>
           </a:p>
@@ -7821,7 +7700,7 @@
         <p:spPr>
           <a:xfrm>
             <a:off x="1197954" y="5769279"/>
-            <a:ext cx="6099651" cy="369332"/>
+            <a:ext cx="8263306" cy="369332"/>
           </a:xfrm>
           <a:prstGeom prst="rect">
             <a:avLst/>
@@ -7835,44 +7714,8 @@
           <a:lstStyle/>
           <a:p>
             <a:r>
-              <a:rPr lang="pt-PT" dirty="0" err="1"/>
-              <a:t>Comment</a:t>
-            </a:r>
-            <a:r>
               <a:rPr lang="pt-PT" dirty="0"/>
-              <a:t>  = </a:t>
-            </a:r>
-            <a:r>
-              <a:rPr lang="pt-PT" dirty="0" err="1"/>
-              <a:t>nick</a:t>
-            </a:r>
-            <a:r>
-              <a:rPr lang="pt-PT" dirty="0"/>
-              <a:t> , Nº </a:t>
-            </a:r>
-            <a:r>
-              <a:rPr lang="pt-PT" dirty="0" err="1"/>
-              <a:t>words</a:t>
-            </a:r>
-            <a:r>
-              <a:rPr lang="pt-PT" dirty="0"/>
-              <a:t> do </a:t>
-            </a:r>
-            <a:r>
-              <a:rPr lang="pt-PT" dirty="0" err="1"/>
-              <a:t>comment</a:t>
-            </a:r>
-            <a:r>
-              <a:rPr lang="pt-PT" dirty="0"/>
-              <a:t>,  lista das </a:t>
-            </a:r>
-            <a:r>
-              <a:rPr lang="pt-PT" dirty="0" err="1"/>
-              <a:t>words</a:t>
-            </a:r>
-            <a:r>
-              <a:rPr lang="pt-PT" dirty="0"/>
-              <a:t> </a:t>
+              <a:t>Guardar Comment: nick , Nº palavras do comment,  lista das palavras </a:t>
             </a:r>
             <a:endParaRPr lang="en-GB" dirty="0"/>
           </a:p>
@@ -9571,8 +9414,8 @@
           <a:lstStyle/>
           <a:p>
             <a:r>
-              <a:rPr lang="pt-PT" dirty="0" err="1"/>
-              <a:t>DoesNotExists</a:t>
+              <a:rPr lang="pt-PT" dirty="0"/>
+              <a:t>DoesNotExist</a:t>
             </a:r>
             <a:endParaRPr lang="en-GB" dirty="0"/>
           </a:p>
@@ -17982,14 +17825,226 @@
         </p:blipFill>
         <p:spPr>
           <a:xfrm>
-            <a:off x="2342628" y="195602"/>
-            <a:ext cx="7773074" cy="6264183"/>
+            <a:off x="2201265" y="128491"/>
+            <a:ext cx="7564553" cy="6096140"/>
           </a:xfrm>
           <a:prstGeom prst="rect">
             <a:avLst/>
           </a:prstGeom>
         </p:spPr>
       </p:pic>
+      <p:sp>
+        <p:nvSpPr>
+          <p:cNvPr id="7" name="TextBox 6">
+            <a:extLst>
+              <a:ext uri="{FF2B5EF4-FFF2-40B4-BE49-F238E27FC236}">
+                <a16:creationId xmlns:a16="http://schemas.microsoft.com/office/drawing/2014/main" id="{0228B701-F70B-4A81-BDA5-ABC9110C65F3}"/>
+              </a:ext>
+            </a:extLst>
+          </p:cNvPr>
+          <p:cNvSpPr txBox="1"/>
+          <p:nvPr/>
+        </p:nvSpPr>
+        <p:spPr>
+          <a:xfrm>
+            <a:off x="637695" y="5767281"/>
+            <a:ext cx="1625766" cy="276999"/>
+          </a:xfrm>
+          <a:prstGeom prst="rect">
+            <a:avLst/>
+          </a:prstGeom>
+          <a:noFill/>
+        </p:spPr>
+        <p:txBody>
+          <a:bodyPr wrap="none" rtlCol="0">
+            <a:spAutoFit/>
+          </a:bodyPr>
+          <a:lstStyle/>
+          <a:p>
+            <a:r>
+              <a:rPr lang="pt-PT" sz="1200" dirty="0"/>
+              <a:t>Origem de LiveStreams</a:t>
+            </a:r>
+            <a:endParaRPr lang="en-US" sz="1200" dirty="0"/>
+          </a:p>
+        </p:txBody>
+      </p:sp>
+      <p:sp>
+        <p:nvSpPr>
+          <p:cNvPr id="11" name="TextBox 10">
+            <a:extLst>
+              <a:ext uri="{FF2B5EF4-FFF2-40B4-BE49-F238E27FC236}">
+                <a16:creationId xmlns:a16="http://schemas.microsoft.com/office/drawing/2014/main" id="{1673FC0D-11CB-4310-A99C-1BE6D4DD9FEF}"/>
+              </a:ext>
+            </a:extLst>
+          </p:cNvPr>
+          <p:cNvSpPr txBox="1"/>
+          <p:nvPr/>
+        </p:nvSpPr>
+        <p:spPr>
+          <a:xfrm>
+            <a:off x="6565651" y="6002266"/>
+            <a:ext cx="1271502" cy="230832"/>
+          </a:xfrm>
+          <a:prstGeom prst="rect">
+            <a:avLst/>
+          </a:prstGeom>
+          <a:noFill/>
+        </p:spPr>
+        <p:txBody>
+          <a:bodyPr wrap="none" rtlCol="0">
+            <a:spAutoFit/>
+          </a:bodyPr>
+          <a:lstStyle/>
+          <a:p>
+            <a:r>
+              <a:rPr lang="pt-PT" sz="900" dirty="0">
+                <a:solidFill>
+                  <a:schemeClr val="bg1"/>
+                </a:solidFill>
+              </a:rPr>
+              <a:t>Origem de LiveStreams</a:t>
+            </a:r>
+            <a:endParaRPr lang="en-US" sz="900" dirty="0">
+              <a:solidFill>
+                <a:schemeClr val="bg1"/>
+              </a:solidFill>
+            </a:endParaRPr>
+          </a:p>
+        </p:txBody>
+      </p:sp>
+      <p:sp>
+        <p:nvSpPr>
+          <p:cNvPr id="13" name="TextBox 12">
+            <a:extLst>
+              <a:ext uri="{FF2B5EF4-FFF2-40B4-BE49-F238E27FC236}">
+                <a16:creationId xmlns:a16="http://schemas.microsoft.com/office/drawing/2014/main" id="{D2E1ADC5-F342-4061-BCA4-A53D16A93576}"/>
+              </a:ext>
+            </a:extLst>
+          </p:cNvPr>
+          <p:cNvSpPr txBox="1"/>
+          <p:nvPr/>
+        </p:nvSpPr>
+        <p:spPr>
+          <a:xfrm>
+            <a:off x="8045870" y="5993799"/>
+            <a:ext cx="968535" cy="230832"/>
+          </a:xfrm>
+          <a:prstGeom prst="rect">
+            <a:avLst/>
+          </a:prstGeom>
+          <a:noFill/>
+        </p:spPr>
+        <p:txBody>
+          <a:bodyPr wrap="none" rtlCol="0">
+            <a:spAutoFit/>
+          </a:bodyPr>
+          <a:lstStyle/>
+          <a:p>
+            <a:r>
+              <a:rPr lang="pt-PT" sz="900" dirty="0">
+                <a:solidFill>
+                  <a:schemeClr val="bg1"/>
+                </a:solidFill>
+              </a:rPr>
+              <a:t>Vai para finished</a:t>
+            </a:r>
+            <a:endParaRPr lang="en-US" sz="900" dirty="0">
+              <a:solidFill>
+                <a:schemeClr val="bg1"/>
+              </a:solidFill>
+            </a:endParaRPr>
+          </a:p>
+        </p:txBody>
+      </p:sp>
+      <p:sp>
+        <p:nvSpPr>
+          <p:cNvPr id="14" name="TextBox 13">
+            <a:extLst>
+              <a:ext uri="{FF2B5EF4-FFF2-40B4-BE49-F238E27FC236}">
+                <a16:creationId xmlns:a16="http://schemas.microsoft.com/office/drawing/2014/main" id="{F4636E69-79DA-41FD-9B95-D334A403A7F9}"/>
+              </a:ext>
+            </a:extLst>
+          </p:cNvPr>
+          <p:cNvSpPr txBox="1"/>
+          <p:nvPr/>
+        </p:nvSpPr>
+        <p:spPr>
+          <a:xfrm>
+            <a:off x="6081383" y="5611292"/>
+            <a:ext cx="968535" cy="230832"/>
+          </a:xfrm>
+          <a:prstGeom prst="rect">
+            <a:avLst/>
+          </a:prstGeom>
+          <a:noFill/>
+        </p:spPr>
+        <p:txBody>
+          <a:bodyPr wrap="none" rtlCol="0">
+            <a:spAutoFit/>
+          </a:bodyPr>
+          <a:lstStyle/>
+          <a:p>
+            <a:r>
+              <a:rPr lang="pt-PT" sz="900" dirty="0">
+                <a:solidFill>
+                  <a:schemeClr val="bg1"/>
+                </a:solidFill>
+              </a:rPr>
+              <a:t>Vai para finished</a:t>
+            </a:r>
+            <a:endParaRPr lang="en-US" sz="900" dirty="0">
+              <a:solidFill>
+                <a:schemeClr val="bg1"/>
+              </a:solidFill>
+            </a:endParaRPr>
+          </a:p>
+        </p:txBody>
+      </p:sp>
+      <p:sp>
+        <p:nvSpPr>
+          <p:cNvPr id="16" name="TextBox 15">
+            <a:extLst>
+              <a:ext uri="{FF2B5EF4-FFF2-40B4-BE49-F238E27FC236}">
+                <a16:creationId xmlns:a16="http://schemas.microsoft.com/office/drawing/2014/main" id="{16508ABF-3B83-4DEE-9CB1-2703047A1470}"/>
+              </a:ext>
+            </a:extLst>
+          </p:cNvPr>
+          <p:cNvSpPr txBox="1"/>
+          <p:nvPr/>
+        </p:nvSpPr>
+        <p:spPr>
+          <a:xfrm>
+            <a:off x="3859698" y="588009"/>
+            <a:ext cx="984565" cy="230832"/>
+          </a:xfrm>
+          <a:prstGeom prst="rect">
+            <a:avLst/>
+          </a:prstGeom>
+          <a:noFill/>
+        </p:spPr>
+        <p:txBody>
+          <a:bodyPr wrap="none" rtlCol="0">
+            <a:spAutoFit/>
+          </a:bodyPr>
+          <a:lstStyle/>
+          <a:p>
+            <a:r>
+              <a:rPr lang="pt-PT" sz="900" dirty="0">
+                <a:solidFill>
+                  <a:schemeClr val="bg1"/>
+                </a:solidFill>
+              </a:rPr>
+              <a:t>Vai para StreamZ</a:t>
+            </a:r>
+            <a:endParaRPr lang="en-US" sz="900" dirty="0">
+              <a:solidFill>
+                <a:schemeClr val="bg1"/>
+              </a:solidFill>
+            </a:endParaRPr>
+          </a:p>
+        </p:txBody>
+      </p:sp>
     </p:spTree>
     <p:extLst>
       <p:ext uri="{BB962C8B-B14F-4D97-AF65-F5344CB8AC3E}">
@@ -18187,14 +18242,158 @@
         </p:blipFill>
         <p:spPr>
           <a:xfrm>
-            <a:off x="2865442" y="33090"/>
-            <a:ext cx="6461115" cy="6873692"/>
+            <a:off x="3061877" y="58257"/>
+            <a:ext cx="5843329" cy="6216457"/>
           </a:xfrm>
           <a:prstGeom prst="rect">
             <a:avLst/>
           </a:prstGeom>
         </p:spPr>
       </p:pic>
+      <p:sp>
+        <p:nvSpPr>
+          <p:cNvPr id="2" name="TextBox 1">
+            <a:extLst>
+              <a:ext uri="{FF2B5EF4-FFF2-40B4-BE49-F238E27FC236}">
+                <a16:creationId xmlns:a16="http://schemas.microsoft.com/office/drawing/2014/main" id="{44B3EEE6-A5FB-408C-A49D-FA380D7C28AF}"/>
+              </a:ext>
+            </a:extLst>
+          </p:cNvPr>
+          <p:cNvSpPr txBox="1"/>
+          <p:nvPr/>
+        </p:nvSpPr>
+        <p:spPr>
+          <a:xfrm>
+            <a:off x="8905206" y="4065497"/>
+            <a:ext cx="1417760" cy="276999"/>
+          </a:xfrm>
+          <a:prstGeom prst="rect">
+            <a:avLst/>
+          </a:prstGeom>
+          <a:noFill/>
+        </p:spPr>
+        <p:txBody>
+          <a:bodyPr wrap="none" rtlCol="0">
+            <a:spAutoFit/>
+          </a:bodyPr>
+          <a:lstStyle/>
+          <a:p>
+            <a:r>
+              <a:rPr lang="pt-PT" sz="1200" dirty="0"/>
+              <a:t>Origem dos viewers</a:t>
+            </a:r>
+            <a:endParaRPr lang="en-US" sz="1200" dirty="0"/>
+          </a:p>
+        </p:txBody>
+      </p:sp>
+      <p:sp>
+        <p:nvSpPr>
+          <p:cNvPr id="11" name="TextBox 10">
+            <a:extLst>
+              <a:ext uri="{FF2B5EF4-FFF2-40B4-BE49-F238E27FC236}">
+                <a16:creationId xmlns:a16="http://schemas.microsoft.com/office/drawing/2014/main" id="{A44B6F7E-7F39-4050-B1E2-CE24C9F5C926}"/>
+              </a:ext>
+            </a:extLst>
+          </p:cNvPr>
+          <p:cNvSpPr txBox="1"/>
+          <p:nvPr/>
+        </p:nvSpPr>
+        <p:spPr>
+          <a:xfrm>
+            <a:off x="8905206" y="4383097"/>
+            <a:ext cx="1563570" cy="276999"/>
+          </a:xfrm>
+          <a:prstGeom prst="rect">
+            <a:avLst/>
+          </a:prstGeom>
+          <a:noFill/>
+        </p:spPr>
+        <p:txBody>
+          <a:bodyPr wrap="none" rtlCol="0">
+            <a:spAutoFit/>
+          </a:bodyPr>
+          <a:lstStyle/>
+          <a:p>
+            <a:r>
+              <a:rPr lang="pt-PT" sz="1200" dirty="0"/>
+              <a:t>Origem dos streamers</a:t>
+            </a:r>
+            <a:endParaRPr lang="en-US" sz="1200" dirty="0"/>
+          </a:p>
+        </p:txBody>
+      </p:sp>
+      <p:sp>
+        <p:nvSpPr>
+          <p:cNvPr id="13" name="TextBox 12">
+            <a:extLst>
+              <a:ext uri="{FF2B5EF4-FFF2-40B4-BE49-F238E27FC236}">
+                <a16:creationId xmlns:a16="http://schemas.microsoft.com/office/drawing/2014/main" id="{B8255DF1-42F4-4984-ADF5-5D2CC30A4210}"/>
+              </a:ext>
+            </a:extLst>
+          </p:cNvPr>
+          <p:cNvSpPr txBox="1"/>
+          <p:nvPr/>
+        </p:nvSpPr>
+        <p:spPr>
+          <a:xfrm>
+            <a:off x="8905206" y="4917736"/>
+            <a:ext cx="1417760" cy="276999"/>
+          </a:xfrm>
+          <a:prstGeom prst="rect">
+            <a:avLst/>
+          </a:prstGeom>
+          <a:noFill/>
+        </p:spPr>
+        <p:txBody>
+          <a:bodyPr wrap="none" rtlCol="0">
+            <a:spAutoFit/>
+          </a:bodyPr>
+          <a:lstStyle/>
+          <a:p>
+            <a:r>
+              <a:rPr lang="pt-PT" sz="1200" dirty="0"/>
+              <a:t>Origem dos viewers</a:t>
+            </a:r>
+            <a:endParaRPr lang="en-US" sz="1200" dirty="0"/>
+          </a:p>
+        </p:txBody>
+      </p:sp>
+      <p:sp>
+        <p:nvSpPr>
+          <p:cNvPr id="14" name="TextBox 13">
+            <a:extLst>
+              <a:ext uri="{FF2B5EF4-FFF2-40B4-BE49-F238E27FC236}">
+                <a16:creationId xmlns:a16="http://schemas.microsoft.com/office/drawing/2014/main" id="{11D743C9-FB47-4288-AE87-59D9F38CE078}"/>
+              </a:ext>
+            </a:extLst>
+          </p:cNvPr>
+          <p:cNvSpPr txBox="1"/>
+          <p:nvPr/>
+        </p:nvSpPr>
+        <p:spPr>
+          <a:xfrm>
+            <a:off x="8905206" y="5279231"/>
+            <a:ext cx="1563570" cy="276999"/>
+          </a:xfrm>
+          <a:prstGeom prst="rect">
+            <a:avLst/>
+          </a:prstGeom>
+          <a:noFill/>
+        </p:spPr>
+        <p:txBody>
+          <a:bodyPr wrap="none" rtlCol="0">
+            <a:spAutoFit/>
+          </a:bodyPr>
+          <a:lstStyle/>
+          <a:p>
+            <a:r>
+              <a:rPr lang="pt-PT" sz="1200" dirty="0"/>
+              <a:t>Origem dos streamers</a:t>
+            </a:r>
+            <a:endParaRPr lang="en-US" sz="1200" dirty="0"/>
+          </a:p>
+        </p:txBody>
+      </p:sp>
     </p:spTree>
     <p:extLst>
       <p:ext uri="{BB962C8B-B14F-4D97-AF65-F5344CB8AC3E}">

</xml_diff>